<commit_message>
Kleine Änderungen an Präsentation v2 und Dateianordnung
</commit_message>
<xml_diff>
--- a/Präsentationen/PP_notenbonus v2.pptx
+++ b/Präsentationen/PP_notenbonus v2.pptx
@@ -398,7 +398,7 @@
               <a:pPr>
                 <a:defRPr/>
               </a:pPr>
-              <a:t>‹#›</a:t>
+              <a:t>‹Nr.›</a:t>
             </a:fld>
             <a:endParaRPr lang="en-GB"/>
           </a:p>
@@ -716,7 +716,7 @@
               <a:pPr>
                 <a:defRPr/>
               </a:pPr>
-              <a:t>‹#›</a:t>
+              <a:t>‹Nr.›</a:t>
             </a:fld>
             <a:endParaRPr lang="en-GB"/>
           </a:p>
@@ -1636,7 +1636,7 @@
             <a:fld id="{CE58CB1E-F828-4F11-99E0-327109AF9DA4}" type="slidenum">
               <a:rPr lang="de-DE" smtClean="0"/>
               <a:pPr/>
-              <a:t>‹#›</a:t>
+              <a:t>‹Nr.›</a:t>
             </a:fld>
             <a:endParaRPr lang="de-DE"/>
           </a:p>
@@ -1812,7 +1812,7 @@
             <a:fld id="{CE58CB1E-F828-4F11-99E0-327109AF9DA4}" type="slidenum">
               <a:rPr lang="de-DE" smtClean="0"/>
               <a:pPr/>
-              <a:t>‹#›</a:t>
+              <a:t>‹Nr.›</a:t>
             </a:fld>
             <a:endParaRPr lang="de-DE"/>
           </a:p>
@@ -2077,7 +2077,7 @@
             <a:fld id="{CE58CB1E-F828-4F11-99E0-327109AF9DA4}" type="slidenum">
               <a:rPr lang="de-DE" smtClean="0"/>
               <a:pPr/>
-              <a:t>‹#›</a:t>
+              <a:t>‹Nr.›</a:t>
             </a:fld>
             <a:endParaRPr lang="de-DE"/>
           </a:p>
@@ -2348,7 +2348,7 @@
             <a:fld id="{CE58CB1E-F828-4F11-99E0-327109AF9DA4}" type="slidenum">
               <a:rPr lang="de-DE" smtClean="0"/>
               <a:pPr/>
-              <a:t>‹#›</a:t>
+              <a:t>‹Nr.›</a:t>
             </a:fld>
             <a:endParaRPr lang="de-DE"/>
           </a:p>
@@ -2588,7 +2588,7 @@
             <a:fld id="{CE58CB1E-F828-4F11-99E0-327109AF9DA4}" type="slidenum">
               <a:rPr lang="de-DE" smtClean="0"/>
               <a:pPr/>
-              <a:t>‹#›</a:t>
+              <a:t>‹Nr.›</a:t>
             </a:fld>
             <a:endParaRPr lang="de-DE"/>
           </a:p>
@@ -2737,7 +2737,7 @@
             <a:fld id="{CE58CB1E-F828-4F11-99E0-327109AF9DA4}" type="slidenum">
               <a:rPr lang="de-DE" smtClean="0"/>
               <a:pPr/>
-              <a:t>‹#›</a:t>
+              <a:t>‹Nr.›</a:t>
             </a:fld>
             <a:endParaRPr lang="de-DE"/>
           </a:p>
@@ -2894,7 +2894,7 @@
             <a:fld id="{CE58CB1E-F828-4F11-99E0-327109AF9DA4}" type="slidenum">
               <a:rPr lang="de-DE" smtClean="0"/>
               <a:pPr/>
-              <a:t>‹#›</a:t>
+              <a:t>‹Nr.›</a:t>
             </a:fld>
             <a:endParaRPr lang="de-DE"/>
           </a:p>
@@ -3123,7 +3123,7 @@
           <a:p>
             <a:fld id="{7A56DD26-32A4-2A43-990A-6F7E5E73786E}" type="datetimeFigureOut">
               <a:rPr lang="en-US" smtClean="0"/>
-              <a:t>11/28/2019</a:t>
+              <a:t>11/28/19</a:t>
             </a:fld>
             <a:endParaRPr lang="en-US"/>
           </a:p>
@@ -3165,7 +3165,7 @@
           <a:p>
             <a:fld id="{186AF604-6CBA-6F4A-A6F6-26E48A4D0EE4}" type="slidenum">
               <a:rPr lang="en-US" smtClean="0"/>
-              <a:t>‹#›</a:t>
+              <a:t>‹Nr.›</a:t>
             </a:fld>
             <a:endParaRPr lang="en-US"/>
           </a:p>
@@ -3291,7 +3291,7 @@
             <a:fld id="{CE58CB1E-F828-4F11-99E0-327109AF9DA4}" type="slidenum">
               <a:rPr lang="de-DE" smtClean="0"/>
               <a:pPr/>
-              <a:t>‹#›</a:t>
+              <a:t>‹Nr.›</a:t>
             </a:fld>
             <a:endParaRPr lang="de-DE" dirty="0"/>
           </a:p>
@@ -3542,7 +3542,7 @@
             <a:fld id="{CE58CB1E-F828-4F11-99E0-327109AF9DA4}" type="slidenum">
               <a:rPr lang="de-DE" smtClean="0"/>
               <a:pPr/>
-              <a:t>‹#›</a:t>
+              <a:t>‹Nr.›</a:t>
             </a:fld>
             <a:endParaRPr lang="de-DE"/>
           </a:p>
@@ -3806,7 +3806,7 @@
             <a:fld id="{CE58CB1E-F828-4F11-99E0-327109AF9DA4}" type="slidenum">
               <a:rPr lang="de-DE" smtClean="0"/>
               <a:pPr/>
-              <a:t>‹#›</a:t>
+              <a:t>‹Nr.›</a:t>
             </a:fld>
             <a:endParaRPr lang="de-DE"/>
           </a:p>
@@ -4055,7 +4055,7 @@
             <a:fld id="{CE58CB1E-F828-4F11-99E0-327109AF9DA4}" type="slidenum">
               <a:rPr lang="de-DE" smtClean="0"/>
               <a:pPr/>
-              <a:t>‹#›</a:t>
+              <a:t>‹Nr.›</a:t>
             </a:fld>
             <a:endParaRPr lang="de-DE"/>
           </a:p>
@@ -4254,7 +4254,7 @@
             <a:fld id="{CE58CB1E-F828-4F11-99E0-327109AF9DA4}" type="slidenum">
               <a:rPr lang="de-DE" smtClean="0"/>
               <a:pPr/>
-              <a:t>‹#›</a:t>
+              <a:t>‹Nr.›</a:t>
             </a:fld>
             <a:endParaRPr lang="de-DE"/>
           </a:p>
@@ -4451,7 +4451,7 @@
             <a:fld id="{CE58CB1E-F828-4F11-99E0-327109AF9DA4}" type="slidenum">
               <a:rPr lang="de-DE" smtClean="0"/>
               <a:pPr/>
-              <a:t>‹#›</a:t>
+              <a:t>‹Nr.›</a:t>
             </a:fld>
             <a:endParaRPr lang="de-DE"/>
           </a:p>
@@ -4770,7 +4770,7 @@
             <a:fld id="{CE58CB1E-F828-4F11-99E0-327109AF9DA4}" type="slidenum">
               <a:rPr lang="de-DE" smtClean="0"/>
               <a:pPr/>
-              <a:t>‹#›</a:t>
+              <a:t>‹Nr.›</a:t>
             </a:fld>
             <a:endParaRPr lang="de-DE"/>
           </a:p>
@@ -4907,7 +4907,7 @@
             <a:fld id="{CE58CB1E-F828-4F11-99E0-327109AF9DA4}" type="slidenum">
               <a:rPr lang="de-DE" smtClean="0"/>
               <a:pPr/>
-              <a:t>‹#›</a:t>
+              <a:t>‹Nr.›</a:t>
             </a:fld>
             <a:endParaRPr lang="de-DE"/>
           </a:p>
@@ -5410,7 +5410,7 @@
                   <a:spcPct val="114000"/>
                 </a:lnSpc>
               </a:pPr>
-              <a:t>‹#›</a:t>
+              <a:t>‹Nr.›</a:t>
             </a:fld>
             <a:endParaRPr lang="de-DE" sz="1200">
               <a:latin typeface="+mn-lt"/>
@@ -5502,7 +5502,7 @@
             <a:fld id="{CE58CB1E-F828-4F11-99E0-327109AF9DA4}" type="slidenum">
               <a:rPr lang="de-DE" smtClean="0"/>
               <a:pPr/>
-              <a:t>‹#›</a:t>
+              <a:t>‹Nr.›</a:t>
             </a:fld>
             <a:endParaRPr lang="de-DE"/>
           </a:p>
@@ -6016,7 +6016,7 @@
             <a:fld id="{CE58CB1E-F828-4F11-99E0-327109AF9DA4}" type="slidenum">
               <a:rPr lang="de-DE" smtClean="0"/>
               <a:pPr/>
-              <a:t>‹#›</a:t>
+              <a:t>‹Nr.›</a:t>
             </a:fld>
             <a:endParaRPr lang="de-DE"/>
           </a:p>
@@ -6664,7 +6664,7 @@
             <a:fld id="{CE58CB1E-F828-4F11-99E0-327109AF9DA4}" type="slidenum">
               <a:rPr lang="de-DE" smtClean="0"/>
               <a:pPr/>
-              <a:t>‹#›</a:t>
+              <a:t>‹Nr.›</a:t>
             </a:fld>
             <a:endParaRPr lang="de-DE"/>
           </a:p>
@@ -7261,7 +7261,7 @@
             <a:fld id="{CE58CB1E-F828-4F11-99E0-327109AF9DA4}" type="slidenum">
               <a:rPr lang="de-DE" smtClean="0"/>
               <a:pPr/>
-              <a:t>‹#›</a:t>
+              <a:t>‹Nr.›</a:t>
             </a:fld>
             <a:endParaRPr lang="de-DE"/>
           </a:p>
@@ -7858,7 +7858,7 @@
             <a:fld id="{CE58CB1E-F828-4F11-99E0-327109AF9DA4}" type="slidenum">
               <a:rPr lang="de-DE" smtClean="0"/>
               <a:pPr/>
-              <a:t>‹#›</a:t>
+              <a:t>‹Nr.›</a:t>
             </a:fld>
             <a:endParaRPr lang="de-DE"/>
           </a:p>
@@ -8597,7 +8597,7 @@
           <p:nvPr>
             <p:extLst>
               <p:ext uri="{D42A27DB-BD31-4B8C-83A1-F6EECF244321}">
-                <p14:modId xmlns:p14="http://schemas.microsoft.com/office/powerpoint/2010/main" val="2473033461"/>
+                <p14:modId xmlns:p14="http://schemas.microsoft.com/office/powerpoint/2010/main" val="800060986"/>
               </p:ext>
             </p:extLst>
           </p:nvPr>
@@ -8775,7 +8775,7 @@
                       <a:pPr algn="ctr"/>
                       <a:r>
                         <a:rPr lang="de-DE" dirty="0" err="1"/>
-                        <a:t>evaluateRound</a:t>
+                        <a:t>roundCompleted</a:t>
                       </a:r>
                       <a:endParaRPr lang="de-DE" dirty="0"/>
                     </a:p>
@@ -8826,7 +8826,7 @@
                       <a:pPr algn="ctr"/>
                       <a:r>
                         <a:rPr lang="de-DE" dirty="0" err="1"/>
-                        <a:t>roundCompleted</a:t>
+                        <a:t>evaluateRound</a:t>
                       </a:r>
                       <a:endParaRPr lang="de-DE" dirty="0"/>
                     </a:p>
@@ -9057,7 +9057,7 @@
                     <a:lstStyle/>
                     <a:p>
                       <a:pPr algn="ctr"/>
-                      <a:endParaRPr lang="de-DE"/>
+                      <a:endParaRPr lang="de-DE" dirty="0"/>
                     </a:p>
                   </a:txBody>
                   <a:tcPr/>
@@ -10414,6 +10414,7 @@
           <a:bodyPr/>
           <a:lstStyle/>
           <a:p>
+            <a:pPr algn="ctr"/>
             <a:r>
               <a:rPr lang="en-GB" dirty="0" err="1"/>
               <a:t>DocBook</a:t>
@@ -10456,16 +10457,16 @@
               <a:pPr/>
               <a:t>3</a:t>
             </a:fld>
-            <a:endParaRPr lang="de-DE"/>
-          </a:p>
-        </p:txBody>
-      </p:sp>
-      <p:sp>
-        <p:nvSpPr>
-          <p:cNvPr id="5" name="Footer Placeholder 4">
+            <a:endParaRPr lang="de-DE" dirty="0"/>
+          </a:p>
+        </p:txBody>
+      </p:sp>
+      <p:sp>
+        <p:nvSpPr>
+          <p:cNvPr id="7" name="Fußzeilenplatzhalter 4">
             <a:extLst>
               <a:ext uri="{FF2B5EF4-FFF2-40B4-BE49-F238E27FC236}">
-                <a16:creationId xmlns:a16="http://schemas.microsoft.com/office/drawing/2014/main" id="{76CC0BB9-070A-48F4-B46F-CFF6BDEED9C0}"/>
+                <a16:creationId xmlns:a16="http://schemas.microsoft.com/office/drawing/2014/main" id="{B43DD983-1C51-CC40-8D90-D34893AEE4F7}"/>
               </a:ext>
             </a:extLst>
           </p:cNvPr>
@@ -10476,16 +10477,37 @@
             <p:ph type="ftr" sz="quarter" idx="12"/>
           </p:nvPr>
         </p:nvSpPr>
-        <p:spPr/>
+        <p:spPr>
+          <a:xfrm>
+            <a:off x="311162" y="4854985"/>
+            <a:ext cx="6464280" cy="273844"/>
+          </a:xfrm>
+        </p:spPr>
         <p:txBody>
           <a:bodyPr/>
           <a:lstStyle/>
           <a:p>
             <a:r>
-              <a:rPr lang="de-DE"/>
-              <a:t>Dr. rer. nat. Erika Mustermann (TUM) | kann beliebig erweitert werden | Infos mit Strich trennen</a:t>
-            </a:r>
-            <a:endParaRPr lang="en-US"/>
+              <a:rPr lang="en-US" dirty="0" err="1"/>
+              <a:t>Xlink</a:t>
+            </a:r>
+            <a:r>
+              <a:rPr lang="en-US" dirty="0"/>
+              <a:t> | </a:t>
+            </a:r>
+            <a:r>
+              <a:rPr lang="en-US" dirty="0" err="1"/>
+              <a:t>DocBook</a:t>
+            </a:r>
+            <a:r>
+              <a:rPr lang="en-US" dirty="0"/>
+              <a:t> </a:t>
+            </a:r>
+            <a:r>
+              <a:rPr lang="en-US" dirty="0" err="1"/>
+              <a:t>Dokumentation</a:t>
+            </a:r>
+            <a:endParaRPr lang="en-US" dirty="0"/>
           </a:p>
         </p:txBody>
       </p:sp>
@@ -10614,10 +10636,10 @@
       </p:sp>
       <p:sp>
         <p:nvSpPr>
-          <p:cNvPr id="5" name="Footer Placeholder 4">
+          <p:cNvPr id="6" name="Fußzeilenplatzhalter 4">
             <a:extLst>
               <a:ext uri="{FF2B5EF4-FFF2-40B4-BE49-F238E27FC236}">
-                <a16:creationId xmlns:a16="http://schemas.microsoft.com/office/drawing/2014/main" id="{2B28BE0C-9D26-4B08-AD60-EFC07EDBE79B}"/>
+                <a16:creationId xmlns:a16="http://schemas.microsoft.com/office/drawing/2014/main" id="{A204A55A-28BF-754D-8027-ED3BBFF5223B}"/>
               </a:ext>
             </a:extLst>
           </p:cNvPr>
@@ -10628,16 +10650,37 @@
             <p:ph type="ftr" sz="quarter" idx="12"/>
           </p:nvPr>
         </p:nvSpPr>
-        <p:spPr/>
+        <p:spPr>
+          <a:xfrm>
+            <a:off x="311162" y="4854985"/>
+            <a:ext cx="6464280" cy="273844"/>
+          </a:xfrm>
+        </p:spPr>
         <p:txBody>
           <a:bodyPr/>
           <a:lstStyle/>
           <a:p>
             <a:r>
-              <a:rPr lang="de-DE"/>
-              <a:t>Dr. rer. nat. Erika Mustermann (TUM) | kann beliebig erweitert werden | Infos mit Strich trennen</a:t>
-            </a:r>
-            <a:endParaRPr lang="en-US"/>
+              <a:rPr lang="en-US" dirty="0" err="1"/>
+              <a:t>Xlink</a:t>
+            </a:r>
+            <a:r>
+              <a:rPr lang="en-US" dirty="0"/>
+              <a:t> | </a:t>
+            </a:r>
+            <a:r>
+              <a:rPr lang="en-US" dirty="0" err="1"/>
+              <a:t>DocBook</a:t>
+            </a:r>
+            <a:r>
+              <a:rPr lang="en-US" dirty="0"/>
+              <a:t> </a:t>
+            </a:r>
+            <a:r>
+              <a:rPr lang="en-US" dirty="0" err="1"/>
+              <a:t>Dokumentation</a:t>
+            </a:r>
+            <a:endParaRPr lang="en-US" dirty="0"/>
           </a:p>
         </p:txBody>
       </p:sp>

</xml_diff>